<commit_message>
regenerer diagr 4 et 7 maj du power point
</commit_message>
<xml_diff>
--- a/presentationSISOA.pptx
+++ b/presentationSISOA.pptx
@@ -210,7 +210,7 @@
           <a:p>
             <a:fld id="{D83E0C5E-CE1A-854B-B127-2EB19053E37A}" type="datetime1">
               <a:rPr lang="fr-FR" smtClean="0"/>
-              <a:t>22/03/12</a:t>
+              <a:t>22/03/2012</a:t>
             </a:fld>
             <a:endParaRPr lang="fr-FR"/>
           </a:p>
@@ -276,7 +276,7 @@
           <a:p>
             <a:fld id="{18A2B51F-6B87-0046-B9AA-56142C46A4CF}" type="slidenum">
               <a:rPr lang="fr-FR" smtClean="0"/>
-              <a:t>‹#›</a:t>
+              <a:t>‹N°›</a:t>
             </a:fld>
             <a:endParaRPr lang="fr-FR"/>
           </a:p>
@@ -376,7 +376,7 @@
           <a:p>
             <a:fld id="{4FED75F5-793A-154C-B00B-0E07E503FC33}" type="datetime1">
               <a:rPr lang="fr-FR" smtClean="0"/>
-              <a:t>22/03/12</a:t>
+              <a:t>22/03/2012</a:t>
             </a:fld>
             <a:endParaRPr lang="fr-FR"/>
           </a:p>
@@ -535,7 +535,7 @@
           <a:p>
             <a:fld id="{DD4C968C-CB21-4045-A6E1-B1053904A3EB}" type="slidenum">
               <a:rPr lang="fr-FR" smtClean="0"/>
-              <a:t>‹#›</a:t>
+              <a:t>‹N°›</a:t>
             </a:fld>
             <a:endParaRPr lang="fr-FR"/>
           </a:p>
@@ -1012,7 +1012,7 @@
           <a:p>
             <a:fld id="{62837156-AC2E-4645-BC86-B2F703CCE2CD}" type="datetime1">
               <a:rPr lang="fr-FR" smtClean="0"/>
-              <a:t>22/03/12</a:t>
+              <a:t>22/03/2012</a:t>
             </a:fld>
             <a:endParaRPr lang="en-US"/>
           </a:p>
@@ -1054,7 +1054,7 @@
           <a:p>
             <a:fld id="{886BB73A-582F-4420-9A14-CB10A2B2E5E8}" type="slidenum">
               <a:rPr lang="en-US" smtClean="0"/>
-              <a:t>‹#›</a:t>
+              <a:t>‹N°›</a:t>
             </a:fld>
             <a:endParaRPr lang="en-US"/>
           </a:p>
@@ -1204,7 +1204,7 @@
           <a:p>
             <a:fld id="{A5D28C3E-9E72-334C-AAFA-8EEC35EF4A54}" type="datetime1">
               <a:rPr lang="fr-FR" smtClean="0"/>
-              <a:t>22/03/12</a:t>
+              <a:t>22/03/2012</a:t>
             </a:fld>
             <a:endParaRPr lang="en-US"/>
           </a:p>
@@ -1246,7 +1246,7 @@
           <a:p>
             <a:fld id="{886BB73A-582F-4420-9A14-CB10A2B2E5E8}" type="slidenum">
               <a:rPr lang="en-US" smtClean="0"/>
-              <a:t>‹#›</a:t>
+              <a:t>‹N°›</a:t>
             </a:fld>
             <a:endParaRPr lang="en-US"/>
           </a:p>
@@ -1473,7 +1473,7 @@
           <a:p>
             <a:fld id="{B589B341-5EC4-C746-87BF-4823EBE8AB35}" type="datetime1">
               <a:rPr lang="fr-FR" smtClean="0"/>
-              <a:t>22/03/12</a:t>
+              <a:t>22/03/2012</a:t>
             </a:fld>
             <a:endParaRPr lang="en-US"/>
           </a:p>
@@ -1515,7 +1515,7 @@
           <a:p>
             <a:fld id="{886BB73A-582F-4420-9A14-CB10A2B2E5E8}" type="slidenum">
               <a:rPr lang="en-US" smtClean="0"/>
-              <a:t>‹#›</a:t>
+              <a:t>‹N°›</a:t>
             </a:fld>
             <a:endParaRPr lang="en-US"/>
           </a:p>
@@ -1652,7 +1652,7 @@
           <a:p>
             <a:fld id="{2FB35FDB-0AA1-784E-B467-E58FB747B781}" type="datetime1">
               <a:rPr lang="fr-FR" smtClean="0"/>
-              <a:t>22/03/12</a:t>
+              <a:t>22/03/2012</a:t>
             </a:fld>
             <a:endParaRPr lang="en-US"/>
           </a:p>
@@ -1694,7 +1694,7 @@
           <a:p>
             <a:fld id="{886BB73A-582F-4420-9A14-CB10A2B2E5E8}" type="slidenum">
               <a:rPr lang="en-US" smtClean="0"/>
-              <a:t>‹#›</a:t>
+              <a:t>‹N°›</a:t>
             </a:fld>
             <a:endParaRPr lang="en-US"/>
           </a:p>
@@ -1821,7 +1821,7 @@
           <a:p>
             <a:fld id="{65970BA4-A08A-4944-A817-8BD1CDCE6144}" type="datetime1">
               <a:rPr lang="fr-FR" smtClean="0"/>
-              <a:t>22/03/12</a:t>
+              <a:t>22/03/2012</a:t>
             </a:fld>
             <a:endParaRPr lang="en-US"/>
           </a:p>
@@ -1863,7 +1863,7 @@
           <a:p>
             <a:fld id="{886BB73A-582F-4420-9A14-CB10A2B2E5E8}" type="slidenum">
               <a:rPr lang="en-US" smtClean="0"/>
-              <a:t>‹#›</a:t>
+              <a:t>‹N°›</a:t>
             </a:fld>
             <a:endParaRPr lang="en-US"/>
           </a:p>
@@ -2063,7 +2063,7 @@
           <a:p>
             <a:fld id="{3429557D-741A-8E41-A0C1-AC23412D9F73}" type="datetime1">
               <a:rPr lang="fr-FR" smtClean="0"/>
-              <a:t>22/03/12</a:t>
+              <a:t>22/03/2012</a:t>
             </a:fld>
             <a:endParaRPr lang="en-US"/>
           </a:p>
@@ -2105,7 +2105,7 @@
           <a:p>
             <a:fld id="{886BB73A-582F-4420-9A14-CB10A2B2E5E8}" type="slidenum">
               <a:rPr lang="en-US" smtClean="0"/>
-              <a:t>‹#›</a:t>
+              <a:t>‹N°›</a:t>
             </a:fld>
             <a:endParaRPr lang="en-US"/>
           </a:p>
@@ -2386,7 +2386,7 @@
           <a:p>
             <a:fld id="{386E7856-1874-8742-AB1A-F875DC755AF3}" type="datetime1">
               <a:rPr lang="fr-FR" smtClean="0"/>
-              <a:t>22/03/12</a:t>
+              <a:t>22/03/2012</a:t>
             </a:fld>
             <a:endParaRPr lang="en-US"/>
           </a:p>
@@ -2428,7 +2428,7 @@
           <a:p>
             <a:fld id="{886BB73A-582F-4420-9A14-CB10A2B2E5E8}" type="slidenum">
               <a:rPr lang="en-US" smtClean="0"/>
-              <a:t>‹#›</a:t>
+              <a:t>‹N°›</a:t>
             </a:fld>
             <a:endParaRPr lang="en-US"/>
           </a:p>
@@ -2684,7 +2684,7 @@
           <a:p>
             <a:fld id="{926F2CCA-946B-4F4A-81F2-2F5F017F2163}" type="datetime1">
               <a:rPr lang="fr-FR" smtClean="0"/>
-              <a:t>22/03/12</a:t>
+              <a:t>22/03/2012</a:t>
             </a:fld>
             <a:endParaRPr lang="en-US"/>
           </a:p>
@@ -2726,7 +2726,7 @@
           <a:p>
             <a:fld id="{886BB73A-582F-4420-9A14-CB10A2B2E5E8}" type="slidenum">
               <a:rPr lang="en-US" smtClean="0"/>
-              <a:t>‹#›</a:t>
+              <a:t>‹N°›</a:t>
             </a:fld>
             <a:endParaRPr lang="en-US"/>
           </a:p>
@@ -3140,7 +3140,7 @@
           <a:p>
             <a:fld id="{E0407183-CE6D-664E-8885-9DE2281C7D00}" type="datetime1">
               <a:rPr lang="fr-FR" smtClean="0"/>
-              <a:t>22/03/12</a:t>
+              <a:t>22/03/2012</a:t>
             </a:fld>
             <a:endParaRPr lang="en-US"/>
           </a:p>
@@ -3182,7 +3182,7 @@
           <a:p>
             <a:fld id="{886BB73A-582F-4420-9A14-CB10A2B2E5E8}" type="slidenum">
               <a:rPr lang="en-US" smtClean="0"/>
-              <a:t>‹#›</a:t>
+              <a:t>‹N°›</a:t>
             </a:fld>
             <a:endParaRPr lang="en-US"/>
           </a:p>
@@ -3253,7 +3253,7 @@
           <a:p>
             <a:fld id="{8C4311F8-2E88-9C44-B35C-39A6D78E9095}" type="datetime1">
               <a:rPr lang="fr-FR" smtClean="0"/>
-              <a:t>22/03/12</a:t>
+              <a:t>22/03/2012</a:t>
             </a:fld>
             <a:endParaRPr lang="en-US"/>
           </a:p>
@@ -3295,7 +3295,7 @@
           <a:p>
             <a:fld id="{886BB73A-582F-4420-9A14-CB10A2B2E5E8}" type="slidenum">
               <a:rPr lang="en-US" smtClean="0"/>
-              <a:t>‹#›</a:t>
+              <a:t>‹N°›</a:t>
             </a:fld>
             <a:endParaRPr lang="en-US"/>
           </a:p>
@@ -3343,7 +3343,7 @@
           <a:p>
             <a:fld id="{8F07602B-ADD0-A049-BA12-8A14F916F04D}" type="datetime1">
               <a:rPr lang="fr-FR" smtClean="0"/>
-              <a:t>22/03/12</a:t>
+              <a:t>22/03/2012</a:t>
             </a:fld>
             <a:endParaRPr lang="en-US"/>
           </a:p>
@@ -3385,7 +3385,7 @@
           <a:p>
             <a:fld id="{886BB73A-582F-4420-9A14-CB10A2B2E5E8}" type="slidenum">
               <a:rPr lang="en-US" smtClean="0"/>
-              <a:t>‹#›</a:t>
+              <a:t>‹N°›</a:t>
             </a:fld>
             <a:endParaRPr lang="en-US"/>
           </a:p>
@@ -3625,7 +3625,7 @@
           <a:p>
             <a:fld id="{5C79CA3F-5F58-D34D-8D4F-E39C02189453}" type="datetime1">
               <a:rPr lang="fr-FR" smtClean="0"/>
-              <a:t>22/03/12</a:t>
+              <a:t>22/03/2012</a:t>
             </a:fld>
             <a:endParaRPr lang="en-US"/>
           </a:p>
@@ -3667,7 +3667,7 @@
           <a:p>
             <a:fld id="{886BB73A-582F-4420-9A14-CB10A2B2E5E8}" type="slidenum">
               <a:rPr lang="en-US" smtClean="0"/>
-              <a:t>‹#›</a:t>
+              <a:t>‹N°›</a:t>
             </a:fld>
             <a:endParaRPr lang="en-US"/>
           </a:p>
@@ -3831,7 +3831,7 @@
           <a:p>
             <a:fld id="{9910C8AB-582C-C844-906A-6C49A16C9735}" type="datetime1">
               <a:rPr lang="fr-FR" smtClean="0"/>
-              <a:t>22/03/12</a:t>
+              <a:t>22/03/2012</a:t>
             </a:fld>
             <a:endParaRPr lang="en-US"/>
           </a:p>
@@ -3905,7 +3905,7 @@
           <a:p>
             <a:fld id="{886BB73A-582F-4420-9A14-CB10A2B2E5E8}" type="slidenum">
               <a:rPr lang="en-US" smtClean="0"/>
-              <a:t>‹#›</a:t>
+              <a:t>‹N°›</a:t>
             </a:fld>
             <a:endParaRPr lang="en-US"/>
           </a:p>
@@ -4428,7 +4428,7 @@
   <p:timing>
     <p:tnLst>
       <p:par>
-        <p:cTn xmlns:p14="http://schemas.microsoft.com/office/powerpoint/2010/main" id="1" dur="indefinite" restart="never" nodeType="tmRoot"/>
+        <p:cTn id="1" dur="indefinite" restart="never" nodeType="tmRoot"/>
       </p:par>
     </p:tnLst>
   </p:timing>
@@ -4480,16 +4480,39 @@
           </a:p>
         </p:txBody>
       </p:sp>
+      <p:sp>
+        <p:nvSpPr>
+          <p:cNvPr id="5" name="Slide Number Placeholder 4"/>
+          <p:cNvSpPr>
+            <a:spLocks noGrp="1"/>
+          </p:cNvSpPr>
+          <p:nvPr>
+            <p:ph type="sldNum" sz="quarter" idx="12"/>
+          </p:nvPr>
+        </p:nvSpPr>
+        <p:spPr/>
+        <p:txBody>
+          <a:bodyPr/>
+          <a:lstStyle/>
+          <a:p>
+            <a:fld id="{886BB73A-582F-4420-9A14-CB10A2B2E5E8}" type="slidenum">
+              <a:rPr lang="en-US" smtClean="0"/>
+              <a:t>10</a:t>
+            </a:fld>
+            <a:endParaRPr lang="en-US"/>
+          </a:p>
+        </p:txBody>
+      </p:sp>
       <p:pic>
         <p:nvPicPr>
-          <p:cNvPr id="4" name="Picture 3" descr="cu7.png"/>
+          <p:cNvPr id="3" name="Image 2"/>
           <p:cNvPicPr>
             <a:picLocks noChangeAspect="1"/>
           </p:cNvPicPr>
           <p:nvPr/>
         </p:nvPicPr>
         <p:blipFill>
-          <a:blip r:embed="rId2">
+          <a:blip r:embed="rId2" cstate="email">
             <a:extLst>
               <a:ext uri="{28A0092B-C50C-407E-A947-70E740481C1C}">
                 <a14:useLocalDpi xmlns:a14="http://schemas.microsoft.com/office/drawing/2010/main" val="0"/>
@@ -4502,37 +4525,14 @@
         </p:blipFill>
         <p:spPr>
           <a:xfrm>
-            <a:off x="1128500" y="757460"/>
-            <a:ext cx="6887000" cy="6100539"/>
+            <a:off x="1149790" y="757461"/>
+            <a:ext cx="6907795" cy="6100539"/>
           </a:xfrm>
           <a:prstGeom prst="rect">
             <a:avLst/>
           </a:prstGeom>
         </p:spPr>
       </p:pic>
-      <p:sp>
-        <p:nvSpPr>
-          <p:cNvPr id="5" name="Slide Number Placeholder 4"/>
-          <p:cNvSpPr>
-            <a:spLocks noGrp="1"/>
-          </p:cNvSpPr>
-          <p:nvPr>
-            <p:ph type="sldNum" sz="quarter" idx="12"/>
-          </p:nvPr>
-        </p:nvSpPr>
-        <p:spPr/>
-        <p:txBody>
-          <a:bodyPr/>
-          <a:lstStyle/>
-          <a:p>
-            <a:fld id="{886BB73A-582F-4420-9A14-CB10A2B2E5E8}" type="slidenum">
-              <a:rPr lang="en-US" smtClean="0"/>
-              <a:t>10</a:t>
-            </a:fld>
-            <a:endParaRPr lang="en-US"/>
-          </a:p>
-        </p:txBody>
-      </p:sp>
     </p:spTree>
     <p:extLst>
       <p:ext uri="{BB962C8B-B14F-4D97-AF65-F5344CB8AC3E}">
@@ -4546,7 +4546,7 @@
   <p:timing>
     <p:tnLst>
       <p:par>
-        <p:cTn xmlns:p14="http://schemas.microsoft.com/office/powerpoint/2010/main" id="1" dur="indefinite" restart="never" nodeType="tmRoot"/>
+        <p:cTn id="1" dur="indefinite" restart="never" nodeType="tmRoot"/>
       </p:par>
     </p:tnLst>
   </p:timing>
@@ -4598,16 +4598,39 @@
           </a:p>
         </p:txBody>
       </p:sp>
+      <p:sp>
+        <p:nvSpPr>
+          <p:cNvPr id="5" name="Slide Number Placeholder 4"/>
+          <p:cNvSpPr>
+            <a:spLocks noGrp="1"/>
+          </p:cNvSpPr>
+          <p:nvPr>
+            <p:ph type="sldNum" sz="quarter" idx="12"/>
+          </p:nvPr>
+        </p:nvSpPr>
+        <p:spPr/>
+        <p:txBody>
+          <a:bodyPr/>
+          <a:lstStyle/>
+          <a:p>
+            <a:fld id="{886BB73A-582F-4420-9A14-CB10A2B2E5E8}" type="slidenum">
+              <a:rPr lang="en-US" smtClean="0"/>
+              <a:t>11</a:t>
+            </a:fld>
+            <a:endParaRPr lang="en-US"/>
+          </a:p>
+        </p:txBody>
+      </p:sp>
       <p:pic>
         <p:nvPicPr>
-          <p:cNvPr id="3" name="Picture 2" descr="cu4.png"/>
+          <p:cNvPr id="4" name="Image 3"/>
           <p:cNvPicPr>
             <a:picLocks noChangeAspect="1"/>
           </p:cNvPicPr>
           <p:nvPr/>
         </p:nvPicPr>
         <p:blipFill>
-          <a:blip r:embed="rId2">
+          <a:blip r:embed="rId2" cstate="email">
             <a:extLst>
               <a:ext uri="{28A0092B-C50C-407E-A947-70E740481C1C}">
                 <a14:useLocalDpi xmlns:a14="http://schemas.microsoft.com/office/drawing/2010/main" val="0"/>
@@ -4620,37 +4643,14 @@
         </p:blipFill>
         <p:spPr>
           <a:xfrm>
-            <a:off x="733567" y="757462"/>
-            <a:ext cx="7676866" cy="6100538"/>
+            <a:off x="1530037" y="688063"/>
+            <a:ext cx="6226804" cy="6176990"/>
           </a:xfrm>
           <a:prstGeom prst="rect">
             <a:avLst/>
           </a:prstGeom>
         </p:spPr>
       </p:pic>
-      <p:sp>
-        <p:nvSpPr>
-          <p:cNvPr id="5" name="Slide Number Placeholder 4"/>
-          <p:cNvSpPr>
-            <a:spLocks noGrp="1"/>
-          </p:cNvSpPr>
-          <p:nvPr>
-            <p:ph type="sldNum" sz="quarter" idx="12"/>
-          </p:nvPr>
-        </p:nvSpPr>
-        <p:spPr/>
-        <p:txBody>
-          <a:bodyPr/>
-          <a:lstStyle/>
-          <a:p>
-            <a:fld id="{886BB73A-582F-4420-9A14-CB10A2B2E5E8}" type="slidenum">
-              <a:rPr lang="en-US" smtClean="0"/>
-              <a:t>11</a:t>
-            </a:fld>
-            <a:endParaRPr lang="en-US"/>
-          </a:p>
-        </p:txBody>
-      </p:sp>
     </p:spTree>
     <p:extLst>
       <p:ext uri="{BB962C8B-B14F-4D97-AF65-F5344CB8AC3E}">
@@ -4664,7 +4664,7 @@
   <p:timing>
     <p:tnLst>
       <p:par>
-        <p:cTn xmlns:p14="http://schemas.microsoft.com/office/powerpoint/2010/main" id="1" dur="indefinite" restart="never" nodeType="tmRoot"/>
+        <p:cTn id="1" dur="indefinite" restart="never" nodeType="tmRoot"/>
       </p:par>
     </p:tnLst>
   </p:timing>
@@ -4816,11 +4816,7 @@
           <a:p>
             <a:r>
               <a:rPr lang="fr-FR" dirty="0" smtClean="0"/>
-              <a:t>Enchainement des fen</a:t>
-            </a:r>
-            <a:r>
-              <a:rPr lang="fr-FR" dirty="0" smtClean="0"/>
-              <a:t>êtres</a:t>
+              <a:t>Enchainement des fenêtres</a:t>
             </a:r>
             <a:br>
               <a:rPr lang="fr-FR" dirty="0" smtClean="0"/>
@@ -4976,7 +4972,7 @@
           <p:nvPr/>
         </p:nvPicPr>
         <p:blipFill>
-          <a:blip r:embed="rId2">
+          <a:blip r:embed="rId2" cstate="email">
             <a:extLst>
               <a:ext uri="{28A0092B-C50C-407E-A947-70E740481C1C}">
                 <a14:useLocalDpi xmlns:a14="http://schemas.microsoft.com/office/drawing/2010/main" val="0"/>
@@ -5493,7 +5489,7 @@
   <p:timing>
     <p:tnLst>
       <p:par>
-        <p:cTn xmlns:p14="http://schemas.microsoft.com/office/powerpoint/2010/main" id="1" dur="indefinite" restart="never" nodeType="tmRoot"/>
+        <p:cTn id="1" dur="indefinite" restart="never" nodeType="tmRoot"/>
       </p:par>
     </p:tnLst>
   </p:timing>
@@ -5526,7 +5522,7 @@
           <p:nvPr/>
         </p:nvPicPr>
         <p:blipFill>
-          <a:blip r:embed="rId2" cstate="print">
+          <a:blip r:embed="rId2" cstate="email">
             <a:extLst>
               <a:ext uri="{28A0092B-C50C-407E-A947-70E740481C1C}">
                 <a14:useLocalDpi xmlns:a14="http://schemas.microsoft.com/office/drawing/2010/main" val="0"/>
@@ -5614,7 +5610,7 @@
   <p:timing>
     <p:tnLst>
       <p:par>
-        <p:cTn xmlns:p14="http://schemas.microsoft.com/office/powerpoint/2010/main" id="1" dur="indefinite" restart="never" nodeType="tmRoot"/>
+        <p:cTn id="1" dur="indefinite" restart="never" nodeType="tmRoot"/>
       </p:par>
     </p:tnLst>
   </p:timing>
@@ -5678,7 +5674,7 @@
           <p:nvPr/>
         </p:nvPicPr>
         <p:blipFill>
-          <a:blip r:embed="rId2" cstate="print">
+          <a:blip r:embed="rId2" cstate="email">
             <a:extLst>
               <a:ext uri="{28A0092B-C50C-407E-A947-70E740481C1C}">
                 <a14:useLocalDpi xmlns:a14="http://schemas.microsoft.com/office/drawing/2010/main" val="0"/>
@@ -5735,7 +5731,7 @@
   <p:timing>
     <p:tnLst>
       <p:par>
-        <p:cTn xmlns:p14="http://schemas.microsoft.com/office/powerpoint/2010/main" id="1" dur="indefinite" restart="never" nodeType="tmRoot"/>
+        <p:cTn id="1" dur="indefinite" restart="never" nodeType="tmRoot"/>
       </p:par>
     </p:tnLst>
   </p:timing>
@@ -5931,7 +5927,7 @@
           <p:nvPr/>
         </p:nvPicPr>
         <p:blipFill>
-          <a:blip r:embed="rId2">
+          <a:blip r:embed="rId2" cstate="email">
             <a:extLst>
               <a:ext uri="{28A0092B-C50C-407E-A947-70E740481C1C}">
                 <a14:useLocalDpi xmlns:a14="http://schemas.microsoft.com/office/drawing/2010/main" val="0"/>
@@ -6042,7 +6038,7 @@
           <p:nvPr/>
         </p:nvPicPr>
         <p:blipFill>
-          <a:blip r:embed="rId2">
+          <a:blip r:embed="rId2" cstate="email">
             <a:extLst>
               <a:ext uri="{28A0092B-C50C-407E-A947-70E740481C1C}">
                 <a14:useLocalDpi xmlns:a14="http://schemas.microsoft.com/office/drawing/2010/main" val="0"/>
@@ -6215,7 +6211,7 @@
   <p:timing>
     <p:tnLst>
       <p:par>
-        <p:cTn xmlns:p14="http://schemas.microsoft.com/office/powerpoint/2010/main" id="1" dur="indefinite" restart="never" nodeType="tmRoot"/>
+        <p:cTn id="1" dur="indefinite" restart="never" nodeType="tmRoot"/>
       </p:par>
     </p:tnLst>
   </p:timing>

</xml_diff>

<commit_message>
Présentation mise à jour.
Acked-by: Thaddée Tyl
</commit_message>
<xml_diff>
--- a/presentationSISOA.pptx
+++ b/presentationSISOA.pptx
@@ -5,10 +5,10 @@
     <p:sldMasterId id="2147483677" r:id="rId1"/>
   </p:sldMasterIdLst>
   <p:notesMasterIdLst>
-    <p:notesMasterId r:id="rId21"/>
+    <p:notesMasterId r:id="rId23"/>
   </p:notesMasterIdLst>
   <p:handoutMasterIdLst>
-    <p:handoutMasterId r:id="rId22"/>
+    <p:handoutMasterId r:id="rId24"/>
   </p:handoutMasterIdLst>
   <p:sldIdLst>
     <p:sldId id="256" r:id="rId2"/>
@@ -30,6 +30,8 @@
     <p:sldId id="274" r:id="rId18"/>
     <p:sldId id="273" r:id="rId19"/>
     <p:sldId id="272" r:id="rId20"/>
+    <p:sldId id="277" r:id="rId21"/>
+    <p:sldId id="278" r:id="rId22"/>
   </p:sldIdLst>
   <p:sldSz cx="9144000" cy="6858000" type="screen4x3"/>
   <p:notesSz cx="6858000" cy="9144000"/>
@@ -213,7 +215,7 @@
           <a:p>
             <a:fld id="{D83E0C5E-CE1A-854B-B127-2EB19053E37A}" type="datetime1">
               <a:rPr lang="fr-FR" smtClean="0"/>
-              <a:t>23/03/2012</a:t>
+              <a:t>27/03/12</a:t>
             </a:fld>
             <a:endParaRPr lang="fr-FR"/>
           </a:p>
@@ -279,7 +281,7 @@
           <a:p>
             <a:fld id="{18A2B51F-6B87-0046-B9AA-56142C46A4CF}" type="slidenum">
               <a:rPr lang="fr-FR" smtClean="0"/>
-              <a:t>‹N°›</a:t>
+              <a:t>‹#›</a:t>
             </a:fld>
             <a:endParaRPr lang="fr-FR"/>
           </a:p>
@@ -379,7 +381,7 @@
           <a:p>
             <a:fld id="{4FED75F5-793A-154C-B00B-0E07E503FC33}" type="datetime1">
               <a:rPr lang="fr-FR" smtClean="0"/>
-              <a:t>23/03/2012</a:t>
+              <a:t>27/03/12</a:t>
             </a:fld>
             <a:endParaRPr lang="fr-FR"/>
           </a:p>
@@ -538,7 +540,7 @@
           <a:p>
             <a:fld id="{DD4C968C-CB21-4045-A6E1-B1053904A3EB}" type="slidenum">
               <a:rPr lang="fr-FR" smtClean="0"/>
-              <a:t>‹N°›</a:t>
+              <a:t>‹#›</a:t>
             </a:fld>
             <a:endParaRPr lang="fr-FR"/>
           </a:p>
@@ -1015,7 +1017,7 @@
           <a:p>
             <a:fld id="{62837156-AC2E-4645-BC86-B2F703CCE2CD}" type="datetime1">
               <a:rPr lang="fr-FR" smtClean="0"/>
-              <a:t>23/03/2012</a:t>
+              <a:t>27/03/12</a:t>
             </a:fld>
             <a:endParaRPr lang="en-US"/>
           </a:p>
@@ -1057,7 +1059,7 @@
           <a:p>
             <a:fld id="{886BB73A-582F-4420-9A14-CB10A2B2E5E8}" type="slidenum">
               <a:rPr lang="en-US" smtClean="0"/>
-              <a:t>‹N°›</a:t>
+              <a:t>‹#›</a:t>
             </a:fld>
             <a:endParaRPr lang="en-US"/>
           </a:p>
@@ -1207,7 +1209,7 @@
           <a:p>
             <a:fld id="{A5D28C3E-9E72-334C-AAFA-8EEC35EF4A54}" type="datetime1">
               <a:rPr lang="fr-FR" smtClean="0"/>
-              <a:t>23/03/2012</a:t>
+              <a:t>27/03/12</a:t>
             </a:fld>
             <a:endParaRPr lang="en-US"/>
           </a:p>
@@ -1249,7 +1251,7 @@
           <a:p>
             <a:fld id="{886BB73A-582F-4420-9A14-CB10A2B2E5E8}" type="slidenum">
               <a:rPr lang="en-US" smtClean="0"/>
-              <a:t>‹N°›</a:t>
+              <a:t>‹#›</a:t>
             </a:fld>
             <a:endParaRPr lang="en-US"/>
           </a:p>
@@ -1476,7 +1478,7 @@
           <a:p>
             <a:fld id="{B589B341-5EC4-C746-87BF-4823EBE8AB35}" type="datetime1">
               <a:rPr lang="fr-FR" smtClean="0"/>
-              <a:t>23/03/2012</a:t>
+              <a:t>27/03/12</a:t>
             </a:fld>
             <a:endParaRPr lang="en-US"/>
           </a:p>
@@ -1518,7 +1520,7 @@
           <a:p>
             <a:fld id="{886BB73A-582F-4420-9A14-CB10A2B2E5E8}" type="slidenum">
               <a:rPr lang="en-US" smtClean="0"/>
-              <a:t>‹N°›</a:t>
+              <a:t>‹#›</a:t>
             </a:fld>
             <a:endParaRPr lang="en-US"/>
           </a:p>
@@ -1655,7 +1657,7 @@
           <a:p>
             <a:fld id="{2FB35FDB-0AA1-784E-B467-E58FB747B781}" type="datetime1">
               <a:rPr lang="fr-FR" smtClean="0"/>
-              <a:t>23/03/2012</a:t>
+              <a:t>27/03/12</a:t>
             </a:fld>
             <a:endParaRPr lang="en-US"/>
           </a:p>
@@ -1697,7 +1699,7 @@
           <a:p>
             <a:fld id="{886BB73A-582F-4420-9A14-CB10A2B2E5E8}" type="slidenum">
               <a:rPr lang="en-US" smtClean="0"/>
-              <a:t>‹N°›</a:t>
+              <a:t>‹#›</a:t>
             </a:fld>
             <a:endParaRPr lang="en-US"/>
           </a:p>
@@ -1824,7 +1826,7 @@
           <a:p>
             <a:fld id="{65970BA4-A08A-4944-A817-8BD1CDCE6144}" type="datetime1">
               <a:rPr lang="fr-FR" smtClean="0"/>
-              <a:t>23/03/2012</a:t>
+              <a:t>27/03/12</a:t>
             </a:fld>
             <a:endParaRPr lang="en-US"/>
           </a:p>
@@ -1866,7 +1868,7 @@
           <a:p>
             <a:fld id="{886BB73A-582F-4420-9A14-CB10A2B2E5E8}" type="slidenum">
               <a:rPr lang="en-US" smtClean="0"/>
-              <a:t>‹N°›</a:t>
+              <a:t>‹#›</a:t>
             </a:fld>
             <a:endParaRPr lang="en-US"/>
           </a:p>
@@ -2066,7 +2068,7 @@
           <a:p>
             <a:fld id="{3429557D-741A-8E41-A0C1-AC23412D9F73}" type="datetime1">
               <a:rPr lang="fr-FR" smtClean="0"/>
-              <a:t>23/03/2012</a:t>
+              <a:t>27/03/12</a:t>
             </a:fld>
             <a:endParaRPr lang="en-US"/>
           </a:p>
@@ -2108,7 +2110,7 @@
           <a:p>
             <a:fld id="{886BB73A-582F-4420-9A14-CB10A2B2E5E8}" type="slidenum">
               <a:rPr lang="en-US" smtClean="0"/>
-              <a:t>‹N°›</a:t>
+              <a:t>‹#›</a:t>
             </a:fld>
             <a:endParaRPr lang="en-US"/>
           </a:p>
@@ -2389,7 +2391,7 @@
           <a:p>
             <a:fld id="{386E7856-1874-8742-AB1A-F875DC755AF3}" type="datetime1">
               <a:rPr lang="fr-FR" smtClean="0"/>
-              <a:t>23/03/2012</a:t>
+              <a:t>27/03/12</a:t>
             </a:fld>
             <a:endParaRPr lang="en-US"/>
           </a:p>
@@ -2431,7 +2433,7 @@
           <a:p>
             <a:fld id="{886BB73A-582F-4420-9A14-CB10A2B2E5E8}" type="slidenum">
               <a:rPr lang="en-US" smtClean="0"/>
-              <a:t>‹N°›</a:t>
+              <a:t>‹#›</a:t>
             </a:fld>
             <a:endParaRPr lang="en-US"/>
           </a:p>
@@ -2687,7 +2689,7 @@
           <a:p>
             <a:fld id="{926F2CCA-946B-4F4A-81F2-2F5F017F2163}" type="datetime1">
               <a:rPr lang="fr-FR" smtClean="0"/>
-              <a:t>23/03/2012</a:t>
+              <a:t>27/03/12</a:t>
             </a:fld>
             <a:endParaRPr lang="en-US"/>
           </a:p>
@@ -2729,7 +2731,7 @@
           <a:p>
             <a:fld id="{886BB73A-582F-4420-9A14-CB10A2B2E5E8}" type="slidenum">
               <a:rPr lang="en-US" smtClean="0"/>
-              <a:t>‹N°›</a:t>
+              <a:t>‹#›</a:t>
             </a:fld>
             <a:endParaRPr lang="en-US"/>
           </a:p>
@@ -3143,7 +3145,7 @@
           <a:p>
             <a:fld id="{E0407183-CE6D-664E-8885-9DE2281C7D00}" type="datetime1">
               <a:rPr lang="fr-FR" smtClean="0"/>
-              <a:t>23/03/2012</a:t>
+              <a:t>27/03/12</a:t>
             </a:fld>
             <a:endParaRPr lang="en-US"/>
           </a:p>
@@ -3185,7 +3187,7 @@
           <a:p>
             <a:fld id="{886BB73A-582F-4420-9A14-CB10A2B2E5E8}" type="slidenum">
               <a:rPr lang="en-US" smtClean="0"/>
-              <a:t>‹N°›</a:t>
+              <a:t>‹#›</a:t>
             </a:fld>
             <a:endParaRPr lang="en-US"/>
           </a:p>
@@ -3256,7 +3258,7 @@
           <a:p>
             <a:fld id="{8C4311F8-2E88-9C44-B35C-39A6D78E9095}" type="datetime1">
               <a:rPr lang="fr-FR" smtClean="0"/>
-              <a:t>23/03/2012</a:t>
+              <a:t>27/03/12</a:t>
             </a:fld>
             <a:endParaRPr lang="en-US"/>
           </a:p>
@@ -3298,7 +3300,7 @@
           <a:p>
             <a:fld id="{886BB73A-582F-4420-9A14-CB10A2B2E5E8}" type="slidenum">
               <a:rPr lang="en-US" smtClean="0"/>
-              <a:t>‹N°›</a:t>
+              <a:t>‹#›</a:t>
             </a:fld>
             <a:endParaRPr lang="en-US"/>
           </a:p>
@@ -3346,7 +3348,7 @@
           <a:p>
             <a:fld id="{8F07602B-ADD0-A049-BA12-8A14F916F04D}" type="datetime1">
               <a:rPr lang="fr-FR" smtClean="0"/>
-              <a:t>23/03/2012</a:t>
+              <a:t>27/03/12</a:t>
             </a:fld>
             <a:endParaRPr lang="en-US"/>
           </a:p>
@@ -3388,7 +3390,7 @@
           <a:p>
             <a:fld id="{886BB73A-582F-4420-9A14-CB10A2B2E5E8}" type="slidenum">
               <a:rPr lang="en-US" smtClean="0"/>
-              <a:t>‹N°›</a:t>
+              <a:t>‹#›</a:t>
             </a:fld>
             <a:endParaRPr lang="en-US"/>
           </a:p>
@@ -3628,7 +3630,7 @@
           <a:p>
             <a:fld id="{5C79CA3F-5F58-D34D-8D4F-E39C02189453}" type="datetime1">
               <a:rPr lang="fr-FR" smtClean="0"/>
-              <a:t>23/03/2012</a:t>
+              <a:t>27/03/12</a:t>
             </a:fld>
             <a:endParaRPr lang="en-US"/>
           </a:p>
@@ -3670,7 +3672,7 @@
           <a:p>
             <a:fld id="{886BB73A-582F-4420-9A14-CB10A2B2E5E8}" type="slidenum">
               <a:rPr lang="en-US" smtClean="0"/>
-              <a:t>‹N°›</a:t>
+              <a:t>‹#›</a:t>
             </a:fld>
             <a:endParaRPr lang="en-US"/>
           </a:p>
@@ -3834,7 +3836,7 @@
           <a:p>
             <a:fld id="{9910C8AB-582C-C844-906A-6C49A16C9735}" type="datetime1">
               <a:rPr lang="fr-FR" smtClean="0"/>
-              <a:t>23/03/2012</a:t>
+              <a:t>27/03/12</a:t>
             </a:fld>
             <a:endParaRPr lang="en-US"/>
           </a:p>
@@ -3908,7 +3910,7 @@
           <a:p>
             <a:fld id="{886BB73A-582F-4420-9A14-CB10A2B2E5E8}" type="slidenum">
               <a:rPr lang="en-US" smtClean="0"/>
-              <a:t>‹N°›</a:t>
+              <a:t>‹#›</a:t>
             </a:fld>
             <a:endParaRPr lang="en-US"/>
           </a:p>
@@ -4446,7 +4448,7 @@
   <p:timing>
     <p:tnLst>
       <p:par>
-        <p:cTn id="1" dur="indefinite" restart="never" nodeType="tmRoot"/>
+        <p:cTn xmlns:p14="http://schemas.microsoft.com/office/powerpoint/2010/main" id="1" dur="indefinite" restart="never" nodeType="tmRoot"/>
       </p:par>
     </p:tnLst>
   </p:timing>
@@ -4523,14 +4525,14 @@
       </p:sp>
       <p:pic>
         <p:nvPicPr>
-          <p:cNvPr id="3" name="Image 2"/>
+          <p:cNvPr id="4" name="Picture 3" descr="cu7.png"/>
           <p:cNvPicPr>
             <a:picLocks noChangeAspect="1"/>
           </p:cNvPicPr>
           <p:nvPr/>
         </p:nvPicPr>
         <p:blipFill>
-          <a:blip r:embed="rId2" cstate="email">
+          <a:blip r:embed="rId2">
             <a:extLst>
               <a:ext uri="{28A0092B-C50C-407E-A947-70E740481C1C}">
                 <a14:useLocalDpi xmlns:a14="http://schemas.microsoft.com/office/drawing/2010/main" val="0"/>
@@ -4543,8 +4545,8 @@
         </p:blipFill>
         <p:spPr>
           <a:xfrm>
-            <a:off x="1149790" y="757461"/>
-            <a:ext cx="6907795" cy="6100539"/>
+            <a:off x="1825737" y="635064"/>
+            <a:ext cx="5492527" cy="6222936"/>
           </a:xfrm>
           <a:prstGeom prst="rect">
             <a:avLst/>
@@ -4564,7 +4566,7 @@
   <p:timing>
     <p:tnLst>
       <p:par>
-        <p:cTn id="1" dur="indefinite" restart="never" nodeType="tmRoot"/>
+        <p:cTn xmlns:p14="http://schemas.microsoft.com/office/powerpoint/2010/main" id="1" dur="indefinite" restart="never" nodeType="tmRoot"/>
       </p:par>
     </p:tnLst>
   </p:timing>
@@ -4641,14 +4643,14 @@
       </p:sp>
       <p:pic>
         <p:nvPicPr>
-          <p:cNvPr id="4" name="Image 3"/>
+          <p:cNvPr id="3" name="Picture 2" descr="cu4.png"/>
           <p:cNvPicPr>
             <a:picLocks noChangeAspect="1"/>
           </p:cNvPicPr>
           <p:nvPr/>
         </p:nvPicPr>
         <p:blipFill>
-          <a:blip r:embed="rId2" cstate="email">
+          <a:blip r:embed="rId2">
             <a:extLst>
               <a:ext uri="{28A0092B-C50C-407E-A947-70E740481C1C}">
                 <a14:useLocalDpi xmlns:a14="http://schemas.microsoft.com/office/drawing/2010/main" val="0"/>
@@ -4661,8 +4663,8 @@
         </p:blipFill>
         <p:spPr>
           <a:xfrm>
-            <a:off x="1530037" y="688063"/>
-            <a:ext cx="6226804" cy="6176990"/>
+            <a:off x="642390" y="757460"/>
+            <a:ext cx="7599118" cy="6100539"/>
           </a:xfrm>
           <a:prstGeom prst="rect">
             <a:avLst/>
@@ -4682,7 +4684,7 @@
   <p:timing>
     <p:tnLst>
       <p:par>
-        <p:cTn id="1" dur="indefinite" restart="never" nodeType="tmRoot"/>
+        <p:cTn xmlns:p14="http://schemas.microsoft.com/office/powerpoint/2010/main" id="1" dur="indefinite" restart="never" nodeType="tmRoot"/>
       </p:par>
     </p:tnLst>
   </p:timing>
@@ -5064,14 +5066,14 @@
       </p:sp>
       <p:pic>
         <p:nvPicPr>
-          <p:cNvPr id="3" name="Image 2"/>
+          <p:cNvPr id="5" name="Picture 4" descr="diagramme-collaboration.png"/>
           <p:cNvPicPr>
             <a:picLocks noChangeAspect="1"/>
           </p:cNvPicPr>
           <p:nvPr/>
         </p:nvPicPr>
         <p:blipFill>
-          <a:blip r:embed="rId2" cstate="email">
+          <a:blip r:embed="rId2">
             <a:extLst>
               <a:ext uri="{28A0092B-C50C-407E-A947-70E740481C1C}">
                 <a14:useLocalDpi xmlns:a14="http://schemas.microsoft.com/office/drawing/2010/main" val="0"/>
@@ -5084,8 +5086,8 @@
         </p:blipFill>
         <p:spPr>
           <a:xfrm>
-            <a:off x="427916" y="913621"/>
-            <a:ext cx="8460590" cy="5434474"/>
+            <a:off x="235003" y="732902"/>
+            <a:ext cx="8673994" cy="6019807"/>
           </a:xfrm>
           <a:prstGeom prst="rect">
             <a:avLst/>
@@ -5255,10 +5257,6 @@
           <a:bodyPr/>
           <a:lstStyle/>
           <a:p>
-            <a:r>
-              <a:rPr lang="fr-FR" sz="3200" dirty="0" smtClean="0"/>
-              <a:t>Ecran de Login</a:t>
-            </a:r>
             <a:endParaRPr lang="fr-FR" sz="3200" dirty="0"/>
           </a:p>
         </p:txBody>
@@ -5461,7 +5459,12 @@
             <p:ph type="title"/>
           </p:nvPr>
         </p:nvSpPr>
-        <p:spPr/>
+        <p:spPr>
+          <a:xfrm>
+            <a:off x="549275" y="811670"/>
+            <a:ext cx="8042276" cy="1336956"/>
+          </a:xfrm>
+        </p:spPr>
         <p:txBody>
           <a:bodyPr/>
           <a:lstStyle/>
@@ -5593,66 +5596,9 @@
           <a:bodyPr/>
           <a:lstStyle/>
           <a:p>
-            <a:r>
-              <a:rPr lang="fr-FR" dirty="0" smtClean="0"/>
-              <a:t>Synchronisation des travaux</a:t>
-            </a:r>
-          </a:p>
-          <a:p>
-            <a:pPr lvl="1"/>
-            <a:r>
-              <a:rPr lang="fr-FR" dirty="0" err="1" smtClean="0"/>
-              <a:t>Redmine</a:t>
-            </a:r>
-            <a:endParaRPr lang="fr-FR" dirty="0" smtClean="0"/>
-          </a:p>
-          <a:p>
-            <a:r>
-              <a:rPr lang="fr-FR" dirty="0" smtClean="0"/>
-              <a:t>Collaboration par les outils</a:t>
-            </a:r>
-          </a:p>
-          <a:p>
-            <a:pPr lvl="1"/>
-            <a:r>
-              <a:rPr lang="fr-FR" dirty="0" err="1" smtClean="0"/>
-              <a:t>Github</a:t>
-            </a:r>
-            <a:endParaRPr lang="fr-FR" dirty="0" smtClean="0"/>
-          </a:p>
-          <a:p>
-            <a:pPr lvl="1"/>
-            <a:r>
-              <a:rPr lang="fr-FR" dirty="0" err="1" smtClean="0"/>
-              <a:t>Dropbox</a:t>
-            </a:r>
-            <a:endParaRPr lang="fr-FR" dirty="0" smtClean="0"/>
-          </a:p>
-          <a:p>
-            <a:pPr lvl="1"/>
-            <a:r>
-              <a:rPr lang="en-US" dirty="0" err="1" smtClean="0"/>
-              <a:t>Etherpad</a:t>
-            </a:r>
-            <a:endParaRPr lang="en-US" dirty="0" smtClean="0"/>
-          </a:p>
-          <a:p>
-            <a:pPr lvl="1"/>
-            <a:r>
-              <a:rPr lang="en-US" dirty="0" smtClean="0"/>
-              <a:t>…</a:t>
-            </a:r>
-            <a:endParaRPr lang="fr-FR" dirty="0"/>
-          </a:p>
-          <a:p>
-            <a:r>
-              <a:rPr lang="fr-FR" dirty="0" smtClean="0"/>
-              <a:t>Moteur principal </a:t>
-            </a:r>
-            <a:r>
-              <a:rPr lang="fr-FR" smtClean="0"/>
-              <a:t>: la Communication</a:t>
-            </a:r>
+            <a:pPr marL="349250" lvl="1" indent="0">
+              <a:buNone/>
+            </a:pPr>
             <a:endParaRPr lang="fr-FR" dirty="0"/>
           </a:p>
         </p:txBody>
@@ -5680,6 +5626,36 @@
           </a:p>
         </p:txBody>
       </p:sp>
+      <p:pic>
+        <p:nvPicPr>
+          <p:cNvPr id="5" name="Picture 4" descr="charges-effectives.png"/>
+          <p:cNvPicPr>
+            <a:picLocks noChangeAspect="1"/>
+          </p:cNvPicPr>
+          <p:nvPr/>
+        </p:nvPicPr>
+        <p:blipFill>
+          <a:blip r:embed="rId2">
+            <a:extLst>
+              <a:ext uri="{28A0092B-C50C-407E-A947-70E740481C1C}">
+                <a14:useLocalDpi xmlns:a14="http://schemas.microsoft.com/office/drawing/2010/main" val="0"/>
+              </a:ext>
+            </a:extLst>
+          </a:blip>
+          <a:stretch>
+            <a:fillRect/>
+          </a:stretch>
+        </p:blipFill>
+        <p:spPr>
+          <a:xfrm>
+            <a:off x="756348" y="1563968"/>
+            <a:ext cx="7620000" cy="4711700"/>
+          </a:xfrm>
+          <a:prstGeom prst="rect">
+            <a:avLst/>
+          </a:prstGeom>
+        </p:spPr>
+      </p:pic>
     </p:spTree>
     <p:extLst>
       <p:ext uri="{BB962C8B-B14F-4D97-AF65-F5344CB8AC3E}">
@@ -5811,6 +5787,217 @@
 </p:sld>
 </file>
 
+<file path=ppt/slides/slide20.xml><?xml version="1.0" encoding="utf-8"?>
+<p:sld xmlns:a="http://schemas.openxmlformats.org/drawingml/2006/main" xmlns:r="http://schemas.openxmlformats.org/officeDocument/2006/relationships" xmlns:p="http://schemas.openxmlformats.org/presentationml/2006/main">
+  <p:cSld>
+    <p:spTree>
+      <p:nvGrpSpPr>
+        <p:cNvPr id="1" name=""/>
+        <p:cNvGrpSpPr/>
+        <p:nvPr/>
+      </p:nvGrpSpPr>
+      <p:grpSpPr>
+        <a:xfrm>
+          <a:off x="0" y="0"/>
+          <a:ext cx="0" cy="0"/>
+          <a:chOff x="0" y="0"/>
+          <a:chExt cx="0" cy="0"/>
+        </a:xfrm>
+      </p:grpSpPr>
+      <p:sp>
+        <p:nvSpPr>
+          <p:cNvPr id="2" name="Title 1"/>
+          <p:cNvSpPr>
+            <a:spLocks noGrp="1"/>
+          </p:cNvSpPr>
+          <p:nvPr>
+            <p:ph type="title"/>
+          </p:nvPr>
+        </p:nvSpPr>
+        <p:spPr/>
+        <p:txBody>
+          <a:bodyPr/>
+          <a:lstStyle/>
+          <a:p>
+            <a:r>
+              <a:rPr lang="fr-FR" dirty="0" smtClean="0"/>
+              <a:t>Bilan du projet</a:t>
+            </a:r>
+            <a:endParaRPr lang="fr-FR" dirty="0"/>
+          </a:p>
+        </p:txBody>
+      </p:sp>
+      <p:sp>
+        <p:nvSpPr>
+          <p:cNvPr id="3" name="Content Placeholder 2"/>
+          <p:cNvSpPr>
+            <a:spLocks noGrp="1"/>
+          </p:cNvSpPr>
+          <p:nvPr>
+            <p:ph idx="1"/>
+          </p:nvPr>
+        </p:nvSpPr>
+        <p:spPr/>
+        <p:txBody>
+          <a:bodyPr/>
+          <a:lstStyle/>
+          <a:p>
+            <a:r>
+              <a:rPr lang="fr-FR" dirty="0" smtClean="0"/>
+              <a:t>Sous-estimation du temps nécessaire à la conception d’ensemble et à la gestion du projet</a:t>
+            </a:r>
+          </a:p>
+          <a:p>
+            <a:r>
+              <a:rPr lang="fr-FR" dirty="0" smtClean="0"/>
+              <a:t>Surestimation de l’architecture technique et de la présentation</a:t>
+            </a:r>
+          </a:p>
+          <a:p>
+            <a:r>
+              <a:rPr lang="fr-FR" dirty="0" smtClean="0"/>
+              <a:t>Synchronisation des processus bien gérée</a:t>
+            </a:r>
+          </a:p>
+        </p:txBody>
+      </p:sp>
+      <p:sp>
+        <p:nvSpPr>
+          <p:cNvPr id="4" name="Slide Number Placeholder 3"/>
+          <p:cNvSpPr>
+            <a:spLocks noGrp="1"/>
+          </p:cNvSpPr>
+          <p:nvPr>
+            <p:ph type="sldNum" sz="quarter" idx="12"/>
+          </p:nvPr>
+        </p:nvSpPr>
+        <p:spPr/>
+        <p:txBody>
+          <a:bodyPr/>
+          <a:lstStyle/>
+          <a:p>
+            <a:fld id="{886BB73A-582F-4420-9A14-CB10A2B2E5E8}" type="slidenum">
+              <a:rPr lang="en-US" smtClean="0"/>
+              <a:t>20</a:t>
+            </a:fld>
+            <a:endParaRPr lang="en-US"/>
+          </a:p>
+        </p:txBody>
+      </p:sp>
+    </p:spTree>
+    <p:extLst>
+      <p:ext uri="{BB962C8B-B14F-4D97-AF65-F5344CB8AC3E}">
+        <p14:creationId xmlns:p14="http://schemas.microsoft.com/office/powerpoint/2010/main" val="391019022"/>
+      </p:ext>
+    </p:extLst>
+  </p:cSld>
+  <p:clrMapOvr>
+    <a:masterClrMapping/>
+  </p:clrMapOvr>
+</p:sld>
+</file>
+
+<file path=ppt/slides/slide21.xml><?xml version="1.0" encoding="utf-8"?>
+<p:sld xmlns:a="http://schemas.openxmlformats.org/drawingml/2006/main" xmlns:r="http://schemas.openxmlformats.org/officeDocument/2006/relationships" xmlns:p="http://schemas.openxmlformats.org/presentationml/2006/main">
+  <p:cSld>
+    <p:spTree>
+      <p:nvGrpSpPr>
+        <p:cNvPr id="1" name=""/>
+        <p:cNvGrpSpPr/>
+        <p:nvPr/>
+      </p:nvGrpSpPr>
+      <p:grpSpPr>
+        <a:xfrm>
+          <a:off x="0" y="0"/>
+          <a:ext cx="0" cy="0"/>
+          <a:chOff x="0" y="0"/>
+          <a:chExt cx="0" cy="0"/>
+        </a:xfrm>
+      </p:grpSpPr>
+      <p:sp>
+        <p:nvSpPr>
+          <p:cNvPr id="2" name="Title 1"/>
+          <p:cNvSpPr>
+            <a:spLocks noGrp="1"/>
+          </p:cNvSpPr>
+          <p:nvPr>
+            <p:ph type="title"/>
+          </p:nvPr>
+        </p:nvSpPr>
+        <p:spPr/>
+        <p:txBody>
+          <a:bodyPr/>
+          <a:lstStyle/>
+          <a:p>
+            <a:endParaRPr lang="fr-FR" dirty="0"/>
+          </a:p>
+        </p:txBody>
+      </p:sp>
+      <p:sp>
+        <p:nvSpPr>
+          <p:cNvPr id="3" name="Content Placeholder 2"/>
+          <p:cNvSpPr>
+            <a:spLocks noGrp="1"/>
+          </p:cNvSpPr>
+          <p:nvPr>
+            <p:ph idx="1"/>
+          </p:nvPr>
+        </p:nvSpPr>
+        <p:spPr/>
+        <p:txBody>
+          <a:bodyPr/>
+          <a:lstStyle/>
+          <a:p>
+            <a:r>
+              <a:rPr lang="fr-FR" dirty="0" smtClean="0"/>
+              <a:t>Merci de nous avoir écouté.</a:t>
+            </a:r>
+          </a:p>
+          <a:p>
+            <a:r>
+              <a:rPr lang="fr-FR" dirty="0" smtClean="0"/>
+              <a:t>Questions?</a:t>
+            </a:r>
+            <a:endParaRPr lang="fr-FR" dirty="0"/>
+          </a:p>
+        </p:txBody>
+      </p:sp>
+      <p:sp>
+        <p:nvSpPr>
+          <p:cNvPr id="4" name="Slide Number Placeholder 3"/>
+          <p:cNvSpPr>
+            <a:spLocks noGrp="1"/>
+          </p:cNvSpPr>
+          <p:nvPr>
+            <p:ph type="sldNum" sz="quarter" idx="12"/>
+          </p:nvPr>
+        </p:nvSpPr>
+        <p:spPr/>
+        <p:txBody>
+          <a:bodyPr/>
+          <a:lstStyle/>
+          <a:p>
+            <a:fld id="{886BB73A-582F-4420-9A14-CB10A2B2E5E8}" type="slidenum">
+              <a:rPr lang="en-US" smtClean="0"/>
+              <a:t>21</a:t>
+            </a:fld>
+            <a:endParaRPr lang="en-US"/>
+          </a:p>
+        </p:txBody>
+      </p:sp>
+    </p:spTree>
+    <p:extLst>
+      <p:ext uri="{BB962C8B-B14F-4D97-AF65-F5344CB8AC3E}">
+        <p14:creationId xmlns:p14="http://schemas.microsoft.com/office/powerpoint/2010/main" val="4091414596"/>
+      </p:ext>
+    </p:extLst>
+  </p:cSld>
+  <p:clrMapOvr>
+    <a:masterClrMapping/>
+  </p:clrMapOvr>
+</p:sld>
+</file>
+
 <file path=ppt/slides/slide3.xml><?xml version="1.0" encoding="utf-8"?>
 <p:sld xmlns:a="http://schemas.openxmlformats.org/drawingml/2006/main" xmlns:r="http://schemas.openxmlformats.org/officeDocument/2006/relationships" xmlns:p="http://schemas.openxmlformats.org/presentationml/2006/main">
   <p:cSld>
@@ -5940,7 +6127,7 @@
   <p:timing>
     <p:tnLst>
       <p:par>
-        <p:cTn id="1" dur="indefinite" restart="never" nodeType="tmRoot"/>
+        <p:cTn xmlns:p14="http://schemas.microsoft.com/office/powerpoint/2010/main" id="1" dur="indefinite" restart="never" nodeType="tmRoot"/>
       </p:par>
     </p:tnLst>
   </p:timing>
@@ -5986,8 +6173,8 @@
         </p:blipFill>
         <p:spPr>
           <a:xfrm>
-            <a:off x="4051495" y="0"/>
-            <a:ext cx="4340457" cy="6858000"/>
+            <a:off x="4445168" y="0"/>
+            <a:ext cx="3946784" cy="6858000"/>
           </a:xfrm>
           <a:prstGeom prst="rect">
             <a:avLst/>
@@ -6061,7 +6248,7 @@
   <p:timing>
     <p:tnLst>
       <p:par>
-        <p:cTn id="1" dur="indefinite" restart="never" nodeType="tmRoot"/>
+        <p:cTn xmlns:p14="http://schemas.microsoft.com/office/powerpoint/2010/main" id="1" dur="indefinite" restart="never" nodeType="tmRoot"/>
       </p:par>
     </p:tnLst>
   </p:timing>
@@ -6116,16 +6303,39 @@
           </a:p>
         </p:txBody>
       </p:sp>
+      <p:sp>
+        <p:nvSpPr>
+          <p:cNvPr id="3" name="Slide Number Placeholder 2"/>
+          <p:cNvSpPr>
+            <a:spLocks noGrp="1"/>
+          </p:cNvSpPr>
+          <p:nvPr>
+            <p:ph type="sldNum" sz="quarter" idx="12"/>
+          </p:nvPr>
+        </p:nvSpPr>
+        <p:spPr/>
+        <p:txBody>
+          <a:bodyPr/>
+          <a:lstStyle/>
+          <a:p>
+            <a:fld id="{886BB73A-582F-4420-9A14-CB10A2B2E5E8}" type="slidenum">
+              <a:rPr lang="en-US" smtClean="0"/>
+              <a:t>5</a:t>
+            </a:fld>
+            <a:endParaRPr lang="en-US"/>
+          </a:p>
+        </p:txBody>
+      </p:sp>
       <p:pic>
         <p:nvPicPr>
-          <p:cNvPr id="2" name="Picture 1" descr="DACU5.png"/>
+          <p:cNvPr id="4" name="Picture 3" descr="DACU5.png"/>
           <p:cNvPicPr>
             <a:picLocks noChangeAspect="1"/>
           </p:cNvPicPr>
           <p:nvPr/>
         </p:nvPicPr>
         <p:blipFill>
-          <a:blip r:embed="rId2" cstate="email">
+          <a:blip r:embed="rId2">
             <a:extLst>
               <a:ext uri="{28A0092B-C50C-407E-A947-70E740481C1C}">
                 <a14:useLocalDpi xmlns:a14="http://schemas.microsoft.com/office/drawing/2010/main" val="0"/>
@@ -6138,37 +6348,14 @@
         </p:blipFill>
         <p:spPr>
           <a:xfrm>
-            <a:off x="3945751" y="0"/>
-            <a:ext cx="4764170" cy="6858000"/>
+            <a:off x="4058630" y="0"/>
+            <a:ext cx="4672709" cy="6858000"/>
           </a:xfrm>
           <a:prstGeom prst="rect">
             <a:avLst/>
           </a:prstGeom>
         </p:spPr>
       </p:pic>
-      <p:sp>
-        <p:nvSpPr>
-          <p:cNvPr id="3" name="Slide Number Placeholder 2"/>
-          <p:cNvSpPr>
-            <a:spLocks noGrp="1"/>
-          </p:cNvSpPr>
-          <p:nvPr>
-            <p:ph type="sldNum" sz="quarter" idx="12"/>
-          </p:nvPr>
-        </p:nvSpPr>
-        <p:spPr/>
-        <p:txBody>
-          <a:bodyPr/>
-          <a:lstStyle/>
-          <a:p>
-            <a:fld id="{886BB73A-582F-4420-9A14-CB10A2B2E5E8}" type="slidenum">
-              <a:rPr lang="en-US" smtClean="0"/>
-              <a:t>5</a:t>
-            </a:fld>
-            <a:endParaRPr lang="en-US"/>
-          </a:p>
-        </p:txBody>
-      </p:sp>
     </p:spTree>
     <p:extLst>
       <p:ext uri="{BB962C8B-B14F-4D97-AF65-F5344CB8AC3E}">
@@ -6182,7 +6369,7 @@
   <p:timing>
     <p:tnLst>
       <p:par>
-        <p:cTn id="1" dur="indefinite" restart="never" nodeType="tmRoot"/>
+        <p:cTn xmlns:p14="http://schemas.microsoft.com/office/powerpoint/2010/main" id="1" dur="indefinite" restart="never" nodeType="tmRoot"/>
       </p:par>
     </p:tnLst>
   </p:timing>
@@ -6662,7 +6849,7 @@
   <p:timing>
     <p:tnLst>
       <p:par>
-        <p:cTn id="1" dur="indefinite" restart="never" nodeType="tmRoot"/>
+        <p:cTn xmlns:p14="http://schemas.microsoft.com/office/powerpoint/2010/main" id="1" dur="indefinite" restart="never" nodeType="tmRoot"/>
       </p:par>
     </p:tnLst>
   </p:timing>

</xml_diff>